<commit_message>
fix for the sound files
</commit_message>
<xml_diff>
--- a/_sources/drawings4images.pptx
+++ b/_sources/drawings4images.pptx
@@ -104,6 +104,11 @@
       </a:defRPr>
     </a:lvl9pPr>
   </p:defaultTextStyle>
+  <p:extLst>
+    <p:ext uri="{EFAFB233-063F-42B5-8137-9DF3F51BA10A}">
+      <p15:sldGuideLst xmlns:p15="http://schemas.microsoft.com/office/powerpoint/2012/main"/>
+    </p:ext>
+  </p:extLst>
 </p:presentation>
 </file>
 
@@ -4424,7 +4429,7 @@
         </p:nvGrpSpPr>
         <p:grpSpPr>
           <a:xfrm>
-            <a:off x="547346" y="3045848"/>
+            <a:off x="547346" y="6026111"/>
             <a:ext cx="965916" cy="528034"/>
             <a:chOff x="566670" y="566670"/>
             <a:chExt cx="965916" cy="528034"/>
@@ -4788,7 +4793,7 @@
         </p:nvSpPr>
         <p:spPr>
           <a:xfrm>
-            <a:off x="978794" y="2640169"/>
+            <a:off x="978794" y="5620432"/>
             <a:ext cx="244699" cy="347730"/>
           </a:xfrm>
           <a:prstGeom prst="downArrow">
@@ -4822,10 +4827,10 @@
       </p:sp>
       <p:grpSp>
         <p:nvGrpSpPr>
-          <p:cNvPr id="37" name="Group 36">
-            <a:extLst>
-              <a:ext uri="{FF2B5EF4-FFF2-40B4-BE49-F238E27FC236}">
-                <a16:creationId xmlns:a16="http://schemas.microsoft.com/office/drawing/2014/main" id="{0455CC45-0711-D645-81A6-52EB6522FCB6}"/>
+          <p:cNvPr id="49" name="Group 48">
+            <a:extLst>
+              <a:ext uri="{FF2B5EF4-FFF2-40B4-BE49-F238E27FC236}">
+                <a16:creationId xmlns:a16="http://schemas.microsoft.com/office/drawing/2014/main" id="{A2006E23-A7FE-0F45-914A-BFF545282876}"/>
               </a:ext>
             </a:extLst>
           </p:cNvPr>
@@ -4834,18 +4839,382 @@
         </p:nvGrpSpPr>
         <p:grpSpPr>
           <a:xfrm>
-            <a:off x="2837639" y="3043700"/>
+            <a:off x="2837639" y="6007029"/>
             <a:ext cx="965916" cy="528034"/>
-            <a:chOff x="566670" y="566670"/>
+            <a:chOff x="2837639" y="3043700"/>
             <a:chExt cx="965916" cy="528034"/>
           </a:xfrm>
         </p:grpSpPr>
+        <p:grpSp>
+          <p:nvGrpSpPr>
+            <p:cNvPr id="37" name="Group 36">
+              <a:extLst>
+                <a:ext uri="{FF2B5EF4-FFF2-40B4-BE49-F238E27FC236}">
+                  <a16:creationId xmlns:a16="http://schemas.microsoft.com/office/drawing/2014/main" id="{0455CC45-0711-D645-81A6-52EB6522FCB6}"/>
+                </a:ext>
+              </a:extLst>
+            </p:cNvPr>
+            <p:cNvGrpSpPr/>
+            <p:nvPr/>
+          </p:nvGrpSpPr>
+          <p:grpSpPr>
+            <a:xfrm>
+              <a:off x="2837639" y="3043700"/>
+              <a:ext cx="965916" cy="528034"/>
+              <a:chOff x="566670" y="566670"/>
+              <a:chExt cx="965916" cy="528034"/>
+            </a:xfrm>
+          </p:grpSpPr>
+          <p:sp>
+            <p:nvSpPr>
+              <p:cNvPr id="38" name="Rounded Rectangle 37">
+                <a:extLst>
+                  <a:ext uri="{FF2B5EF4-FFF2-40B4-BE49-F238E27FC236}">
+                    <a16:creationId xmlns:a16="http://schemas.microsoft.com/office/drawing/2014/main" id="{E4993680-2584-C540-AF0A-BE71AE9E68EE}"/>
+                  </a:ext>
+                </a:extLst>
+              </p:cNvPr>
+              <p:cNvSpPr/>
+              <p:nvPr/>
+            </p:nvSpPr>
+            <p:spPr>
+              <a:xfrm>
+                <a:off x="566670" y="566670"/>
+                <a:ext cx="965916" cy="528034"/>
+              </a:xfrm>
+              <a:prstGeom prst="roundRect">
+                <a:avLst/>
+              </a:prstGeom>
+              <a:solidFill>
+                <a:schemeClr val="accent6"/>
+              </a:solidFill>
+            </p:spPr>
+            <p:style>
+              <a:lnRef idx="2">
+                <a:schemeClr val="accent1">
+                  <a:shade val="50000"/>
+                </a:schemeClr>
+              </a:lnRef>
+              <a:fillRef idx="1">
+                <a:schemeClr val="accent1"/>
+              </a:fillRef>
+              <a:effectRef idx="0">
+                <a:schemeClr val="accent1"/>
+              </a:effectRef>
+              <a:fontRef idx="minor">
+                <a:schemeClr val="lt1"/>
+              </a:fontRef>
+            </p:style>
+            <p:txBody>
+              <a:bodyPr rtlCol="0" anchor="ctr"/>
+              <a:lstStyle/>
+              <a:p>
+                <a:pPr algn="ctr"/>
+                <a:endParaRPr lang="en-US"/>
+              </a:p>
+            </p:txBody>
+          </p:sp>
+          <p:sp>
+            <p:nvSpPr>
+              <p:cNvPr id="39" name="Rectangle 38">
+                <a:extLst>
+                  <a:ext uri="{FF2B5EF4-FFF2-40B4-BE49-F238E27FC236}">
+                    <a16:creationId xmlns:a16="http://schemas.microsoft.com/office/drawing/2014/main" id="{1B30F407-529A-0042-9DA5-0ED5DCAD50CC}"/>
+                  </a:ext>
+                </a:extLst>
+              </p:cNvPr>
+              <p:cNvSpPr/>
+              <p:nvPr/>
+            </p:nvSpPr>
+            <p:spPr>
+              <a:xfrm>
+                <a:off x="643943" y="643944"/>
+                <a:ext cx="64395" cy="373487"/>
+              </a:xfrm>
+              <a:prstGeom prst="rect">
+                <a:avLst/>
+              </a:prstGeom>
+              <a:solidFill>
+                <a:schemeClr val="bg1"/>
+              </a:solidFill>
+            </p:spPr>
+            <p:style>
+              <a:lnRef idx="2">
+                <a:schemeClr val="accent1">
+                  <a:shade val="50000"/>
+                </a:schemeClr>
+              </a:lnRef>
+              <a:fillRef idx="1">
+                <a:schemeClr val="accent1"/>
+              </a:fillRef>
+              <a:effectRef idx="0">
+                <a:schemeClr val="accent1"/>
+              </a:effectRef>
+              <a:fontRef idx="minor">
+                <a:schemeClr val="lt1"/>
+              </a:fontRef>
+            </p:style>
+            <p:txBody>
+              <a:bodyPr rtlCol="0" anchor="ctr"/>
+              <a:lstStyle/>
+              <a:p>
+                <a:pPr algn="ctr"/>
+                <a:endParaRPr lang="en-US"/>
+              </a:p>
+            </p:txBody>
+          </p:sp>
+          <p:sp>
+            <p:nvSpPr>
+              <p:cNvPr id="40" name="Rectangle 39">
+                <a:extLst>
+                  <a:ext uri="{FF2B5EF4-FFF2-40B4-BE49-F238E27FC236}">
+                    <a16:creationId xmlns:a16="http://schemas.microsoft.com/office/drawing/2014/main" id="{887E42B8-F23B-C343-AA6E-5106EFD1552A}"/>
+                  </a:ext>
+                </a:extLst>
+              </p:cNvPr>
+              <p:cNvSpPr/>
+              <p:nvPr/>
+            </p:nvSpPr>
+            <p:spPr>
+              <a:xfrm>
+                <a:off x="796343" y="643944"/>
+                <a:ext cx="64395" cy="373487"/>
+              </a:xfrm>
+              <a:prstGeom prst="rect">
+                <a:avLst/>
+              </a:prstGeom>
+              <a:solidFill>
+                <a:schemeClr val="bg1"/>
+              </a:solidFill>
+            </p:spPr>
+            <p:style>
+              <a:lnRef idx="2">
+                <a:schemeClr val="accent1">
+                  <a:shade val="50000"/>
+                </a:schemeClr>
+              </a:lnRef>
+              <a:fillRef idx="1">
+                <a:schemeClr val="accent1"/>
+              </a:fillRef>
+              <a:effectRef idx="0">
+                <a:schemeClr val="accent1"/>
+              </a:effectRef>
+              <a:fontRef idx="minor">
+                <a:schemeClr val="lt1"/>
+              </a:fontRef>
+            </p:style>
+            <p:txBody>
+              <a:bodyPr rtlCol="0" anchor="ctr"/>
+              <a:lstStyle/>
+              <a:p>
+                <a:pPr algn="ctr"/>
+                <a:endParaRPr lang="en-US"/>
+              </a:p>
+            </p:txBody>
+          </p:sp>
+          <p:sp>
+            <p:nvSpPr>
+              <p:cNvPr id="41" name="Rectangle 40">
+                <a:extLst>
+                  <a:ext uri="{FF2B5EF4-FFF2-40B4-BE49-F238E27FC236}">
+                    <a16:creationId xmlns:a16="http://schemas.microsoft.com/office/drawing/2014/main" id="{AD7E3AB7-3DE5-2843-8909-4169A0BBB8C3}"/>
+                  </a:ext>
+                </a:extLst>
+              </p:cNvPr>
+              <p:cNvSpPr/>
+              <p:nvPr/>
+            </p:nvSpPr>
+            <p:spPr>
+              <a:xfrm>
+                <a:off x="948743" y="643944"/>
+                <a:ext cx="64395" cy="373487"/>
+              </a:xfrm>
+              <a:prstGeom prst="rect">
+                <a:avLst/>
+              </a:prstGeom>
+              <a:solidFill>
+                <a:schemeClr val="bg1"/>
+              </a:solidFill>
+            </p:spPr>
+            <p:style>
+              <a:lnRef idx="2">
+                <a:schemeClr val="accent1">
+                  <a:shade val="50000"/>
+                </a:schemeClr>
+              </a:lnRef>
+              <a:fillRef idx="1">
+                <a:schemeClr val="accent1"/>
+              </a:fillRef>
+              <a:effectRef idx="0">
+                <a:schemeClr val="accent1"/>
+              </a:effectRef>
+              <a:fontRef idx="minor">
+                <a:schemeClr val="lt1"/>
+              </a:fontRef>
+            </p:style>
+            <p:txBody>
+              <a:bodyPr rtlCol="0" anchor="ctr"/>
+              <a:lstStyle/>
+              <a:p>
+                <a:pPr algn="ctr"/>
+                <a:endParaRPr lang="en-US" dirty="0"/>
+              </a:p>
+            </p:txBody>
+          </p:sp>
+          <p:sp>
+            <p:nvSpPr>
+              <p:cNvPr id="42" name="Rectangle 41">
+                <a:extLst>
+                  <a:ext uri="{FF2B5EF4-FFF2-40B4-BE49-F238E27FC236}">
+                    <a16:creationId xmlns:a16="http://schemas.microsoft.com/office/drawing/2014/main" id="{7FEF8D2F-8A7B-9D43-B5AD-71D8ED85BDDF}"/>
+                  </a:ext>
+                </a:extLst>
+              </p:cNvPr>
+              <p:cNvSpPr/>
+              <p:nvPr/>
+            </p:nvSpPr>
+            <p:spPr>
+              <a:xfrm>
+                <a:off x="1101143" y="643944"/>
+                <a:ext cx="64395" cy="373487"/>
+              </a:xfrm>
+              <a:prstGeom prst="rect">
+                <a:avLst/>
+              </a:prstGeom>
+              <a:solidFill>
+                <a:schemeClr val="bg1"/>
+              </a:solidFill>
+            </p:spPr>
+            <p:style>
+              <a:lnRef idx="2">
+                <a:schemeClr val="accent1">
+                  <a:shade val="50000"/>
+                </a:schemeClr>
+              </a:lnRef>
+              <a:fillRef idx="1">
+                <a:schemeClr val="accent1"/>
+              </a:fillRef>
+              <a:effectRef idx="0">
+                <a:schemeClr val="accent1"/>
+              </a:effectRef>
+              <a:fontRef idx="minor">
+                <a:schemeClr val="lt1"/>
+              </a:fontRef>
+            </p:style>
+            <p:txBody>
+              <a:bodyPr rtlCol="0" anchor="ctr"/>
+              <a:lstStyle/>
+              <a:p>
+                <a:pPr algn="ctr"/>
+                <a:endParaRPr lang="en-US"/>
+              </a:p>
+            </p:txBody>
+          </p:sp>
+          <p:sp>
+            <p:nvSpPr>
+              <p:cNvPr id="43" name="Rectangle 42">
+                <a:extLst>
+                  <a:ext uri="{FF2B5EF4-FFF2-40B4-BE49-F238E27FC236}">
+                    <a16:creationId xmlns:a16="http://schemas.microsoft.com/office/drawing/2014/main" id="{A5380931-BD8E-A24E-80A0-F76D753E17C3}"/>
+                  </a:ext>
+                </a:extLst>
+              </p:cNvPr>
+              <p:cNvSpPr/>
+              <p:nvPr/>
+            </p:nvSpPr>
+            <p:spPr>
+              <a:xfrm>
+                <a:off x="1253543" y="643944"/>
+                <a:ext cx="64395" cy="373487"/>
+              </a:xfrm>
+              <a:prstGeom prst="rect">
+                <a:avLst/>
+              </a:prstGeom>
+              <a:solidFill>
+                <a:schemeClr val="bg1"/>
+              </a:solidFill>
+            </p:spPr>
+            <p:style>
+              <a:lnRef idx="2">
+                <a:schemeClr val="accent1">
+                  <a:shade val="50000"/>
+                </a:schemeClr>
+              </a:lnRef>
+              <a:fillRef idx="1">
+                <a:schemeClr val="accent1"/>
+              </a:fillRef>
+              <a:effectRef idx="0">
+                <a:schemeClr val="accent1"/>
+              </a:effectRef>
+              <a:fontRef idx="minor">
+                <a:schemeClr val="lt1"/>
+              </a:fontRef>
+            </p:style>
+            <p:txBody>
+              <a:bodyPr rtlCol="0" anchor="ctr"/>
+              <a:lstStyle/>
+              <a:p>
+                <a:pPr algn="ctr"/>
+                <a:endParaRPr lang="en-US"/>
+              </a:p>
+            </p:txBody>
+          </p:sp>
+          <p:sp>
+            <p:nvSpPr>
+              <p:cNvPr id="44" name="Rectangle 43">
+                <a:extLst>
+                  <a:ext uri="{FF2B5EF4-FFF2-40B4-BE49-F238E27FC236}">
+                    <a16:creationId xmlns:a16="http://schemas.microsoft.com/office/drawing/2014/main" id="{E098104E-5892-6048-AF8F-E667B194F58C}"/>
+                  </a:ext>
+                </a:extLst>
+              </p:cNvPr>
+              <p:cNvSpPr/>
+              <p:nvPr/>
+            </p:nvSpPr>
+            <p:spPr>
+              <a:xfrm>
+                <a:off x="1405943" y="643944"/>
+                <a:ext cx="64395" cy="373487"/>
+              </a:xfrm>
+              <a:prstGeom prst="rect">
+                <a:avLst/>
+              </a:prstGeom>
+              <a:solidFill>
+                <a:schemeClr val="bg1"/>
+              </a:solidFill>
+            </p:spPr>
+            <p:style>
+              <a:lnRef idx="2">
+                <a:schemeClr val="accent1">
+                  <a:shade val="50000"/>
+                </a:schemeClr>
+              </a:lnRef>
+              <a:fillRef idx="1">
+                <a:schemeClr val="accent1"/>
+              </a:fillRef>
+              <a:effectRef idx="0">
+                <a:schemeClr val="accent1"/>
+              </a:effectRef>
+              <a:fontRef idx="minor">
+                <a:schemeClr val="lt1"/>
+              </a:fontRef>
+            </p:style>
+            <p:txBody>
+              <a:bodyPr rtlCol="0" anchor="ctr"/>
+              <a:lstStyle/>
+              <a:p>
+                <a:pPr algn="ctr"/>
+                <a:endParaRPr lang="en-US"/>
+              </a:p>
+            </p:txBody>
+          </p:sp>
+        </p:grpSp>
         <p:sp>
           <p:nvSpPr>
-            <p:cNvPr id="38" name="Rounded Rectangle 37">
+            <p:cNvPr id="45" name="Rectangle 44">
               <a:extLst>
                 <a:ext uri="{FF2B5EF4-FFF2-40B4-BE49-F238E27FC236}">
-                  <a16:creationId xmlns:a16="http://schemas.microsoft.com/office/drawing/2014/main" id="{E4993680-2584-C540-AF0A-BE71AE9E68EE}"/>
+                  <a16:creationId xmlns:a16="http://schemas.microsoft.com/office/drawing/2014/main" id="{E3192E59-6647-384D-99E3-F9542C8397E1}"/>
                 </a:ext>
               </a:extLst>
             </p:cNvPr>
@@ -4854,161 +5223,14 @@
           </p:nvSpPr>
           <p:spPr>
             <a:xfrm>
-              <a:off x="566670" y="566670"/>
-              <a:ext cx="965916" cy="528034"/>
-            </a:xfrm>
-            <a:prstGeom prst="roundRect">
-              <a:avLst/>
-            </a:prstGeom>
-            <a:solidFill>
-              <a:schemeClr val="accent6"/>
-            </a:solidFill>
-          </p:spPr>
-          <p:style>
-            <a:lnRef idx="2">
-              <a:schemeClr val="accent1">
-                <a:shade val="50000"/>
-              </a:schemeClr>
-            </a:lnRef>
-            <a:fillRef idx="1">
-              <a:schemeClr val="accent1"/>
-            </a:fillRef>
-            <a:effectRef idx="0">
-              <a:schemeClr val="accent1"/>
-            </a:effectRef>
-            <a:fontRef idx="minor">
-              <a:schemeClr val="lt1"/>
-            </a:fontRef>
-          </p:style>
-          <p:txBody>
-            <a:bodyPr rtlCol="0" anchor="ctr"/>
-            <a:lstStyle/>
-            <a:p>
-              <a:pPr algn="ctr"/>
-              <a:endParaRPr lang="en-US"/>
-            </a:p>
-          </p:txBody>
-        </p:sp>
-        <p:sp>
-          <p:nvSpPr>
-            <p:cNvPr id="39" name="Rectangle 38">
-              <a:extLst>
-                <a:ext uri="{FF2B5EF4-FFF2-40B4-BE49-F238E27FC236}">
-                  <a16:creationId xmlns:a16="http://schemas.microsoft.com/office/drawing/2014/main" id="{1B30F407-529A-0042-9DA5-0ED5DCAD50CC}"/>
-                </a:ext>
-              </a:extLst>
-            </p:cNvPr>
-            <p:cNvSpPr/>
-            <p:nvPr/>
-          </p:nvSpPr>
-          <p:spPr>
-            <a:xfrm>
-              <a:off x="643943" y="643944"/>
-              <a:ext cx="64395" cy="373487"/>
+              <a:off x="3372112" y="3224486"/>
+              <a:ext cx="64395" cy="274320"/>
             </a:xfrm>
             <a:prstGeom prst="rect">
               <a:avLst/>
             </a:prstGeom>
             <a:solidFill>
-              <a:schemeClr val="bg1"/>
-            </a:solidFill>
-          </p:spPr>
-          <p:style>
-            <a:lnRef idx="2">
-              <a:schemeClr val="accent1">
-                <a:shade val="50000"/>
-              </a:schemeClr>
-            </a:lnRef>
-            <a:fillRef idx="1">
-              <a:schemeClr val="accent1"/>
-            </a:fillRef>
-            <a:effectRef idx="0">
-              <a:schemeClr val="accent1"/>
-            </a:effectRef>
-            <a:fontRef idx="minor">
-              <a:schemeClr val="lt1"/>
-            </a:fontRef>
-          </p:style>
-          <p:txBody>
-            <a:bodyPr rtlCol="0" anchor="ctr"/>
-            <a:lstStyle/>
-            <a:p>
-              <a:pPr algn="ctr"/>
-              <a:endParaRPr lang="en-US"/>
-            </a:p>
-          </p:txBody>
-        </p:sp>
-        <p:sp>
-          <p:nvSpPr>
-            <p:cNvPr id="40" name="Rectangle 39">
-              <a:extLst>
-                <a:ext uri="{FF2B5EF4-FFF2-40B4-BE49-F238E27FC236}">
-                  <a16:creationId xmlns:a16="http://schemas.microsoft.com/office/drawing/2014/main" id="{887E42B8-F23B-C343-AA6E-5106EFD1552A}"/>
-                </a:ext>
-              </a:extLst>
-            </p:cNvPr>
-            <p:cNvSpPr/>
-            <p:nvPr/>
-          </p:nvSpPr>
-          <p:spPr>
-            <a:xfrm>
-              <a:off x="796343" y="643944"/>
-              <a:ext cx="64395" cy="373487"/>
-            </a:xfrm>
-            <a:prstGeom prst="rect">
-              <a:avLst/>
-            </a:prstGeom>
-            <a:solidFill>
-              <a:schemeClr val="bg1"/>
-            </a:solidFill>
-          </p:spPr>
-          <p:style>
-            <a:lnRef idx="2">
-              <a:schemeClr val="accent1">
-                <a:shade val="50000"/>
-              </a:schemeClr>
-            </a:lnRef>
-            <a:fillRef idx="1">
-              <a:schemeClr val="accent1"/>
-            </a:fillRef>
-            <a:effectRef idx="0">
-              <a:schemeClr val="accent1"/>
-            </a:effectRef>
-            <a:fontRef idx="minor">
-              <a:schemeClr val="lt1"/>
-            </a:fontRef>
-          </p:style>
-          <p:txBody>
-            <a:bodyPr rtlCol="0" anchor="ctr"/>
-            <a:lstStyle/>
-            <a:p>
-              <a:pPr algn="ctr"/>
-              <a:endParaRPr lang="en-US"/>
-            </a:p>
-          </p:txBody>
-        </p:sp>
-        <p:sp>
-          <p:nvSpPr>
-            <p:cNvPr id="41" name="Rectangle 40">
-              <a:extLst>
-                <a:ext uri="{FF2B5EF4-FFF2-40B4-BE49-F238E27FC236}">
-                  <a16:creationId xmlns:a16="http://schemas.microsoft.com/office/drawing/2014/main" id="{AD7E3AB7-3DE5-2843-8909-4169A0BBB8C3}"/>
-                </a:ext>
-              </a:extLst>
-            </p:cNvPr>
-            <p:cNvSpPr/>
-            <p:nvPr/>
-          </p:nvSpPr>
-          <p:spPr>
-            <a:xfrm>
-              <a:off x="948743" y="643944"/>
-              <a:ext cx="64395" cy="373487"/>
-            </a:xfrm>
-            <a:prstGeom prst="rect">
-              <a:avLst/>
-            </a:prstGeom>
-            <a:solidFill>
-              <a:schemeClr val="bg1"/>
+              <a:srgbClr val="FF0000"/>
             </a:solidFill>
           </p:spPr>
           <p:style>
@@ -5038,10 +5260,10 @@
         </p:sp>
         <p:sp>
           <p:nvSpPr>
-            <p:cNvPr id="42" name="Rectangle 41">
+            <p:cNvPr id="46" name="Rectangle 45">
               <a:extLst>
                 <a:ext uri="{FF2B5EF4-FFF2-40B4-BE49-F238E27FC236}">
-                  <a16:creationId xmlns:a16="http://schemas.microsoft.com/office/drawing/2014/main" id="{7FEF8D2F-8A7B-9D43-B5AD-71D8ED85BDDF}"/>
+                  <a16:creationId xmlns:a16="http://schemas.microsoft.com/office/drawing/2014/main" id="{C6B7EEAE-E6C6-4643-A4D5-251C4C7CDED5}"/>
                 </a:ext>
               </a:extLst>
             </p:cNvPr>
@@ -5050,14 +5272,14 @@
           </p:nvSpPr>
           <p:spPr>
             <a:xfrm>
-              <a:off x="1101143" y="643944"/>
-              <a:ext cx="64395" cy="373487"/>
+              <a:off x="3219718" y="3224485"/>
+              <a:ext cx="64395" cy="274320"/>
             </a:xfrm>
             <a:prstGeom prst="rect">
               <a:avLst/>
             </a:prstGeom>
             <a:solidFill>
-              <a:schemeClr val="bg1"/>
+              <a:srgbClr val="FF0000"/>
             </a:solidFill>
           </p:spPr>
           <p:style>
@@ -5081,16 +5303,16 @@
             <a:lstStyle/>
             <a:p>
               <a:pPr algn="ctr"/>
-              <a:endParaRPr lang="en-US"/>
+              <a:endParaRPr lang="en-US" dirty="0"/>
             </a:p>
           </p:txBody>
         </p:sp>
         <p:sp>
           <p:nvSpPr>
-            <p:cNvPr id="43" name="Rectangle 42">
+            <p:cNvPr id="47" name="Rectangle 46">
               <a:extLst>
                 <a:ext uri="{FF2B5EF4-FFF2-40B4-BE49-F238E27FC236}">
-                  <a16:creationId xmlns:a16="http://schemas.microsoft.com/office/drawing/2014/main" id="{A5380931-BD8E-A24E-80A0-F76D753E17C3}"/>
+                  <a16:creationId xmlns:a16="http://schemas.microsoft.com/office/drawing/2014/main" id="{B36D10AF-9363-4B44-9798-4CF3E4495C21}"/>
                 </a:ext>
               </a:extLst>
             </p:cNvPr>
@@ -5099,14 +5321,14 @@
           </p:nvSpPr>
           <p:spPr>
             <a:xfrm>
-              <a:off x="1253543" y="643944"/>
-              <a:ext cx="64395" cy="373487"/>
+              <a:off x="3524515" y="3224484"/>
+              <a:ext cx="64395" cy="274320"/>
             </a:xfrm>
             <a:prstGeom prst="rect">
               <a:avLst/>
             </a:prstGeom>
             <a:solidFill>
-              <a:schemeClr val="bg1"/>
+              <a:srgbClr val="FF0000"/>
             </a:solidFill>
           </p:spPr>
           <p:style>
@@ -5130,66 +5352,17 @@
             <a:lstStyle/>
             <a:p>
               <a:pPr algn="ctr"/>
-              <a:endParaRPr lang="en-US"/>
-            </a:p>
-          </p:txBody>
-        </p:sp>
-        <p:sp>
-          <p:nvSpPr>
-            <p:cNvPr id="44" name="Rectangle 43">
-              <a:extLst>
-                <a:ext uri="{FF2B5EF4-FFF2-40B4-BE49-F238E27FC236}">
-                  <a16:creationId xmlns:a16="http://schemas.microsoft.com/office/drawing/2014/main" id="{E098104E-5892-6048-AF8F-E667B194F58C}"/>
-                </a:ext>
-              </a:extLst>
-            </p:cNvPr>
-            <p:cNvSpPr/>
-            <p:nvPr/>
-          </p:nvSpPr>
-          <p:spPr>
-            <a:xfrm>
-              <a:off x="1405943" y="643944"/>
-              <a:ext cx="64395" cy="373487"/>
-            </a:xfrm>
-            <a:prstGeom prst="rect">
-              <a:avLst/>
-            </a:prstGeom>
-            <a:solidFill>
-              <a:schemeClr val="bg1"/>
-            </a:solidFill>
-          </p:spPr>
-          <p:style>
-            <a:lnRef idx="2">
-              <a:schemeClr val="accent1">
-                <a:shade val="50000"/>
-              </a:schemeClr>
-            </a:lnRef>
-            <a:fillRef idx="1">
-              <a:schemeClr val="accent1"/>
-            </a:fillRef>
-            <a:effectRef idx="0">
-              <a:schemeClr val="accent1"/>
-            </a:effectRef>
-            <a:fontRef idx="minor">
-              <a:schemeClr val="lt1"/>
-            </a:fontRef>
-          </p:style>
-          <p:txBody>
-            <a:bodyPr rtlCol="0" anchor="ctr"/>
-            <a:lstStyle/>
-            <a:p>
-              <a:pPr algn="ctr"/>
-              <a:endParaRPr lang="en-US"/>
+              <a:endParaRPr lang="en-US" dirty="0"/>
             </a:p>
           </p:txBody>
         </p:sp>
       </p:grpSp>
       <p:sp>
         <p:nvSpPr>
-          <p:cNvPr id="45" name="Rectangle 44">
-            <a:extLst>
-              <a:ext uri="{FF2B5EF4-FFF2-40B4-BE49-F238E27FC236}">
-                <a16:creationId xmlns:a16="http://schemas.microsoft.com/office/drawing/2014/main" id="{E3192E59-6647-384D-99E3-F9542C8397E1}"/>
+          <p:cNvPr id="48" name="Rectangle 47">
+            <a:extLst>
+              <a:ext uri="{FF2B5EF4-FFF2-40B4-BE49-F238E27FC236}">
+                <a16:creationId xmlns:a16="http://schemas.microsoft.com/office/drawing/2014/main" id="{6010B4BC-9B40-7743-9302-94D242039ABE}"/>
               </a:ext>
             </a:extLst>
           </p:cNvPr>
@@ -5198,154 +5371,7 @@
         </p:nvSpPr>
         <p:spPr>
           <a:xfrm>
-            <a:off x="3372112" y="3207553"/>
-            <a:ext cx="64395" cy="274320"/>
-          </a:xfrm>
-          <a:prstGeom prst="rect">
-            <a:avLst/>
-          </a:prstGeom>
-          <a:solidFill>
-            <a:srgbClr val="FF0000"/>
-          </a:solidFill>
-        </p:spPr>
-        <p:style>
-          <a:lnRef idx="2">
-            <a:schemeClr val="accent1">
-              <a:shade val="50000"/>
-            </a:schemeClr>
-          </a:lnRef>
-          <a:fillRef idx="1">
-            <a:schemeClr val="accent1"/>
-          </a:fillRef>
-          <a:effectRef idx="0">
-            <a:schemeClr val="accent1"/>
-          </a:effectRef>
-          <a:fontRef idx="minor">
-            <a:schemeClr val="lt1"/>
-          </a:fontRef>
-        </p:style>
-        <p:txBody>
-          <a:bodyPr rtlCol="0" anchor="ctr"/>
-          <a:lstStyle/>
-          <a:p>
-            <a:pPr algn="ctr"/>
-            <a:endParaRPr lang="en-US" dirty="0"/>
-          </a:p>
-        </p:txBody>
-      </p:sp>
-      <p:sp>
-        <p:nvSpPr>
-          <p:cNvPr id="46" name="Rectangle 45">
-            <a:extLst>
-              <a:ext uri="{FF2B5EF4-FFF2-40B4-BE49-F238E27FC236}">
-                <a16:creationId xmlns:a16="http://schemas.microsoft.com/office/drawing/2014/main" id="{C6B7EEAE-E6C6-4643-A4D5-251C4C7CDED5}"/>
-              </a:ext>
-            </a:extLst>
-          </p:cNvPr>
-          <p:cNvSpPr/>
-          <p:nvPr/>
-        </p:nvSpPr>
-        <p:spPr>
-          <a:xfrm>
-            <a:off x="3219718" y="3207552"/>
-            <a:ext cx="64395" cy="274320"/>
-          </a:xfrm>
-          <a:prstGeom prst="rect">
-            <a:avLst/>
-          </a:prstGeom>
-          <a:solidFill>
-            <a:srgbClr val="FF0000"/>
-          </a:solidFill>
-        </p:spPr>
-        <p:style>
-          <a:lnRef idx="2">
-            <a:schemeClr val="accent1">
-              <a:shade val="50000"/>
-            </a:schemeClr>
-          </a:lnRef>
-          <a:fillRef idx="1">
-            <a:schemeClr val="accent1"/>
-          </a:fillRef>
-          <a:effectRef idx="0">
-            <a:schemeClr val="accent1"/>
-          </a:effectRef>
-          <a:fontRef idx="minor">
-            <a:schemeClr val="lt1"/>
-          </a:fontRef>
-        </p:style>
-        <p:txBody>
-          <a:bodyPr rtlCol="0" anchor="ctr"/>
-          <a:lstStyle/>
-          <a:p>
-            <a:pPr algn="ctr"/>
-            <a:endParaRPr lang="en-US" dirty="0"/>
-          </a:p>
-        </p:txBody>
-      </p:sp>
-      <p:sp>
-        <p:nvSpPr>
-          <p:cNvPr id="47" name="Rectangle 46">
-            <a:extLst>
-              <a:ext uri="{FF2B5EF4-FFF2-40B4-BE49-F238E27FC236}">
-                <a16:creationId xmlns:a16="http://schemas.microsoft.com/office/drawing/2014/main" id="{B36D10AF-9363-4B44-9798-4CF3E4495C21}"/>
-              </a:ext>
-            </a:extLst>
-          </p:cNvPr>
-          <p:cNvSpPr/>
-          <p:nvPr/>
-        </p:nvSpPr>
-        <p:spPr>
-          <a:xfrm>
-            <a:off x="3524515" y="3207551"/>
-            <a:ext cx="64395" cy="274320"/>
-          </a:xfrm>
-          <a:prstGeom prst="rect">
-            <a:avLst/>
-          </a:prstGeom>
-          <a:solidFill>
-            <a:srgbClr val="FF0000"/>
-          </a:solidFill>
-        </p:spPr>
-        <p:style>
-          <a:lnRef idx="2">
-            <a:schemeClr val="accent1">
-              <a:shade val="50000"/>
-            </a:schemeClr>
-          </a:lnRef>
-          <a:fillRef idx="1">
-            <a:schemeClr val="accent1"/>
-          </a:fillRef>
-          <a:effectRef idx="0">
-            <a:schemeClr val="accent1"/>
-          </a:effectRef>
-          <a:fontRef idx="minor">
-            <a:schemeClr val="lt1"/>
-          </a:fontRef>
-        </p:style>
-        <p:txBody>
-          <a:bodyPr rtlCol="0" anchor="ctr"/>
-          <a:lstStyle/>
-          <a:p>
-            <a:pPr algn="ctr"/>
-            <a:endParaRPr lang="en-US" dirty="0"/>
-          </a:p>
-        </p:txBody>
-      </p:sp>
-      <p:sp>
-        <p:nvSpPr>
-          <p:cNvPr id="48" name="Rectangle 47">
-            <a:extLst>
-              <a:ext uri="{FF2B5EF4-FFF2-40B4-BE49-F238E27FC236}">
-                <a16:creationId xmlns:a16="http://schemas.microsoft.com/office/drawing/2014/main" id="{6010B4BC-9B40-7743-9302-94D242039ABE}"/>
-              </a:ext>
-            </a:extLst>
-          </p:cNvPr>
-          <p:cNvSpPr/>
-          <p:nvPr/>
-        </p:nvSpPr>
-        <p:spPr>
-          <a:xfrm>
-            <a:off x="933721" y="2174619"/>
+            <a:off x="933721" y="5154882"/>
             <a:ext cx="365760" cy="365760"/>
           </a:xfrm>
           <a:prstGeom prst="rect">
@@ -5377,6 +5403,100 @@
           <a:p>
             <a:pPr algn="ctr"/>
             <a:endParaRPr lang="en-US" dirty="0"/>
+          </a:p>
+        </p:txBody>
+      </p:sp>
+      <p:sp>
+        <p:nvSpPr>
+          <p:cNvPr id="50" name="Rectangle 49">
+            <a:extLst>
+              <a:ext uri="{FF2B5EF4-FFF2-40B4-BE49-F238E27FC236}">
+                <a16:creationId xmlns:a16="http://schemas.microsoft.com/office/drawing/2014/main" id="{78E89259-DB8C-C244-8F6F-3FA6F7E2F738}"/>
+              </a:ext>
+            </a:extLst>
+          </p:cNvPr>
+          <p:cNvSpPr/>
+          <p:nvPr/>
+        </p:nvSpPr>
+        <p:spPr>
+          <a:xfrm>
+            <a:off x="237066" y="4792133"/>
+            <a:ext cx="1659467" cy="1947334"/>
+          </a:xfrm>
+          <a:prstGeom prst="rect">
+            <a:avLst/>
+          </a:prstGeom>
+          <a:noFill/>
+        </p:spPr>
+        <p:style>
+          <a:lnRef idx="2">
+            <a:schemeClr val="accent1">
+              <a:shade val="50000"/>
+            </a:schemeClr>
+          </a:lnRef>
+          <a:fillRef idx="1">
+            <a:schemeClr val="accent1"/>
+          </a:fillRef>
+          <a:effectRef idx="0">
+            <a:schemeClr val="accent1"/>
+          </a:effectRef>
+          <a:fontRef idx="minor">
+            <a:schemeClr val="lt1"/>
+          </a:fontRef>
+        </p:style>
+        <p:txBody>
+          <a:bodyPr rtlCol="0" anchor="ctr"/>
+          <a:lstStyle/>
+          <a:p>
+            <a:pPr algn="ctr"/>
+            <a:endParaRPr lang="en-US"/>
+          </a:p>
+        </p:txBody>
+      </p:sp>
+      <p:sp>
+        <p:nvSpPr>
+          <p:cNvPr id="51" name="Rectangle 50">
+            <a:extLst>
+              <a:ext uri="{FF2B5EF4-FFF2-40B4-BE49-F238E27FC236}">
+                <a16:creationId xmlns:a16="http://schemas.microsoft.com/office/drawing/2014/main" id="{B1A904E5-98E2-A34F-AB29-93E168561DE4}"/>
+              </a:ext>
+            </a:extLst>
+          </p:cNvPr>
+          <p:cNvSpPr/>
+          <p:nvPr/>
+        </p:nvSpPr>
+        <p:spPr>
+          <a:xfrm>
+            <a:off x="2506133" y="4792136"/>
+            <a:ext cx="1659467" cy="1947334"/>
+          </a:xfrm>
+          <a:prstGeom prst="rect">
+            <a:avLst/>
+          </a:prstGeom>
+          <a:noFill/>
+        </p:spPr>
+        <p:style>
+          <a:lnRef idx="2">
+            <a:schemeClr val="accent1">
+              <a:shade val="50000"/>
+            </a:schemeClr>
+          </a:lnRef>
+          <a:fillRef idx="1">
+            <a:schemeClr val="accent1"/>
+          </a:fillRef>
+          <a:effectRef idx="0">
+            <a:schemeClr val="accent1"/>
+          </a:effectRef>
+          <a:fontRef idx="minor">
+            <a:schemeClr val="lt1"/>
+          </a:fontRef>
+        </p:style>
+        <p:txBody>
+          <a:bodyPr rtlCol="0" anchor="ctr"/>
+          <a:lstStyle/>
+          <a:p>
+            <a:pPr algn="ctr"/>
+            <a:endParaRPr lang="en-US"/>
           </a:p>
         </p:txBody>
       </p:sp>

</xml_diff>